<commit_message>
Adding homework link to slides
</commit_message>
<xml_diff>
--- a/ClassMaterials/Week8/Week8.pptx
+++ b/ClassMaterials/Week8/Week8.pptx
@@ -241,7 +241,7 @@
           <a:p>
             <a:fld id="{4556A2EE-B5F6-484E-BC83-5FA03CF24537}" type="datetimeFigureOut">
               <a:rPr lang="en-US" smtClean="0"/>
-              <a:t>10/27/2025</a:t>
+              <a:t>10/28/2025</a:t>
             </a:fld>
             <a:endParaRPr lang="en-US"/>
           </a:p>
@@ -5680,10 +5680,24 @@
           <a:lstStyle/>
           <a:p>
             <a:r>
-              <a:rPr lang="en-US"/>
+              <a:rPr lang="en-US" dirty="0"/>
               <a:t>Let’s take a look…</a:t>
             </a:r>
-            <a:endParaRPr lang="en-US" dirty="0"/>
+          </a:p>
+          <a:p>
+            <a:endParaRPr lang="en-US" dirty="0"/>
+          </a:p>
+          <a:p>
+            <a:r>
+              <a:rPr lang="en-US" dirty="0">
+                <a:hlinkClick r:id="rId2"/>
+              </a:rPr>
+              <a:t>https://github.com/RHIT-CSSE/csse290-ai/tree/main/ClassMaterials/Week8</a:t>
+            </a:r>
+            <a:r>
+              <a:rPr lang="en-US" dirty="0"/>
+              <a:t> </a:t>
+            </a:r>
           </a:p>
           <a:p>
             <a:pPr marL="0" indent="0">

</xml_diff>